<commit_message>
updated presentation, working simulations
</commit_message>
<xml_diff>
--- a/Literature Review.pptx
+++ b/Literature Review.pptx
@@ -5,25 +5,26 @@
     <p:sldMasterId id="2147483766" r:id="rId1"/>
   </p:sldMasterIdLst>
   <p:notesMasterIdLst>
-    <p:notesMasterId r:id="rId18"/>
+    <p:notesMasterId r:id="rId19"/>
   </p:notesMasterIdLst>
   <p:sldIdLst>
     <p:sldId id="256" r:id="rId2"/>
     <p:sldId id="257" r:id="rId3"/>
     <p:sldId id="258" r:id="rId4"/>
     <p:sldId id="261" r:id="rId5"/>
-    <p:sldId id="259" r:id="rId6"/>
-    <p:sldId id="269" r:id="rId7"/>
-    <p:sldId id="270" r:id="rId8"/>
-    <p:sldId id="260" r:id="rId9"/>
-    <p:sldId id="271" r:id="rId10"/>
-    <p:sldId id="262" r:id="rId11"/>
+    <p:sldId id="262" r:id="rId6"/>
+    <p:sldId id="259" r:id="rId7"/>
+    <p:sldId id="269" r:id="rId8"/>
+    <p:sldId id="270" r:id="rId9"/>
+    <p:sldId id="260" r:id="rId10"/>
+    <p:sldId id="271" r:id="rId11"/>
     <p:sldId id="268" r:id="rId12"/>
-    <p:sldId id="263" r:id="rId13"/>
-    <p:sldId id="264" r:id="rId14"/>
-    <p:sldId id="265" r:id="rId15"/>
-    <p:sldId id="267" r:id="rId16"/>
-    <p:sldId id="266" r:id="rId17"/>
+    <p:sldId id="272" r:id="rId13"/>
+    <p:sldId id="263" r:id="rId14"/>
+    <p:sldId id="264" r:id="rId15"/>
+    <p:sldId id="265" r:id="rId16"/>
+    <p:sldId id="267" r:id="rId17"/>
+    <p:sldId id="266" r:id="rId18"/>
   </p:sldIdLst>
   <p:sldSz cx="9144000" cy="6858000" type="screen4x3"/>
   <p:notesSz cx="6858000" cy="9144000"/>
@@ -635,11 +636,11 @@
           <a:p>
             <a:r>
               <a:rPr lang="en-US" dirty="0" smtClean="0"/>
-              <a:t>In</a:t>
+              <a:t>Variable</a:t>
             </a:r>
             <a:r>
               <a:rPr lang="en-US" baseline="0" dirty="0" smtClean="0"/>
-              <a:t> power systems, the frequency response can be modeled with equations or simulation software. Simulations offer very precise results, however, they require knowledge of many different parameters related to all components of a system and are therefore difficult to use for large systems. Similarly, full network models have a similar restraint in which many parameters are necessary to be concise and they become very difficult to manage for large systems. Therefore, researchers tend to use simplified models to examine larger systems because they can be adapted to take less variables and still produce a relatively accurate result.</a:t>
+              <a:t> renewable energy sources like wind and solar do not contribute any rotational inertia. Because of this, when more renewables are incorporated into power systems, the overall system inertia decreases. A decrease in inertia means that the frequency response in the event of a major fault or loss of generation (basically any major power imbalance) will be much more severe because the entire system will react faster when there is less inertia to maintain the frequency. This response will be too quick for the primary frequency response controls and could cause cascading trips and wide spread blackouts. </a:t>
             </a:r>
             <a:endParaRPr lang="en-US" dirty="0"/>
           </a:p>
@@ -671,7 +672,7 @@
     </p:spTree>
     <p:extLst>
       <p:ext uri="{BB962C8B-B14F-4D97-AF65-F5344CB8AC3E}">
-        <p14:creationId xmlns:p14="http://schemas.microsoft.com/office/powerpoint/2010/main" val="560159780"/>
+        <p14:creationId xmlns:p14="http://schemas.microsoft.com/office/powerpoint/2010/main" val="26804224"/>
       </p:ext>
     </p:extLst>
   </p:cSld>
@@ -727,11 +728,11 @@
           <a:p>
             <a:r>
               <a:rPr lang="en-US" dirty="0" smtClean="0"/>
-              <a:t>Full network modeling requires</a:t>
+              <a:t>In</a:t>
             </a:r>
             <a:r>
               <a:rPr lang="en-US" baseline="0" dirty="0" smtClean="0"/>
-              <a:t> information about all components in the network for each parameter used which is unfeasible for larger systems. Because of the great number of inputs, it also takes a lot of time.</a:t>
+              <a:t> power systems, the frequency response can be modeled with equations or simulation software. Simulations offer very precise results, however, they require knowledge of many different parameters related to all components of a system and are therefore difficult to use for large systems. Similarly, full network models have a similar restraint in which many parameters are necessary to be concise and they become very difficult to manage for large systems. Therefore, researchers tend to use simplified models to examine larger systems because they can be adapted to take less variables and still produce a relatively accurate result.</a:t>
             </a:r>
             <a:endParaRPr lang="en-US" dirty="0"/>
           </a:p>
@@ -763,7 +764,7 @@
     </p:spTree>
     <p:extLst>
       <p:ext uri="{BB962C8B-B14F-4D97-AF65-F5344CB8AC3E}">
-        <p14:creationId xmlns:p14="http://schemas.microsoft.com/office/powerpoint/2010/main" val="651235159"/>
+        <p14:creationId xmlns:p14="http://schemas.microsoft.com/office/powerpoint/2010/main" val="560159780"/>
       </p:ext>
     </p:extLst>
   </p:cSld>
@@ -819,11 +820,11 @@
           <a:p>
             <a:r>
               <a:rPr lang="en-US" dirty="0" smtClean="0"/>
-              <a:t>Simplified models are less accurate but require much less</a:t>
+              <a:t>Full network modeling requires</a:t>
             </a:r>
             <a:r>
               <a:rPr lang="en-US" baseline="0" dirty="0" smtClean="0"/>
-              <a:t> information which makes it feasible for large network modeling. Also, as THIS paper has shown, the Aggregated Swing eq. is pretty accurate when compared to a simulation.</a:t>
+              <a:t> information about all components in the network for each parameter used which is unfeasible for larger systems. Because of the great number of inputs, it also takes a lot of time.</a:t>
             </a:r>
             <a:endParaRPr lang="en-US" dirty="0"/>
           </a:p>
@@ -855,7 +856,7 @@
     </p:spTree>
     <p:extLst>
       <p:ext uri="{BB962C8B-B14F-4D97-AF65-F5344CB8AC3E}">
-        <p14:creationId xmlns:p14="http://schemas.microsoft.com/office/powerpoint/2010/main" val="1944213096"/>
+        <p14:creationId xmlns:p14="http://schemas.microsoft.com/office/powerpoint/2010/main" val="651235159"/>
       </p:ext>
     </p:extLst>
   </p:cSld>
@@ -911,22 +912,11 @@
           <a:p>
             <a:r>
               <a:rPr lang="en-US" dirty="0" smtClean="0"/>
-              <a:t>We are going to use the swing equation to</a:t>
+              <a:t>Simplified models are less accurate but require much less</a:t>
             </a:r>
             <a:r>
               <a:rPr lang="en-US" baseline="0" dirty="0" smtClean="0"/>
-              <a:t> model the frequency response because it is more accurate than</a:t>
-            </a:r>
-            <a:r>
-              <a:rPr lang="mr-IN" baseline="0" dirty="0" smtClean="0"/>
-              <a:t>…</a:t>
-            </a:r>
-            <a:endParaRPr lang="is-IS" baseline="0" dirty="0" smtClean="0"/>
-          </a:p>
-          <a:p>
-            <a:r>
-              <a:rPr lang="is-IS" baseline="0" dirty="0" smtClean="0"/>
-              <a:t>We are using the aggregated swing equation to adapt the equation to model a whole network. </a:t>
+              <a:t> information which makes it feasible for large network modeling. Also, as THIS paper has shown, the Aggregated Swing eq. is pretty accurate when compared to a simulation.</a:t>
             </a:r>
             <a:endParaRPr lang="en-US" dirty="0"/>
           </a:p>
@@ -958,7 +948,7 @@
     </p:spTree>
     <p:extLst>
       <p:ext uri="{BB962C8B-B14F-4D97-AF65-F5344CB8AC3E}">
-        <p14:creationId xmlns:p14="http://schemas.microsoft.com/office/powerpoint/2010/main" val="132424320"/>
+        <p14:creationId xmlns:p14="http://schemas.microsoft.com/office/powerpoint/2010/main" val="1944213096"/>
       </p:ext>
     </p:extLst>
   </p:cSld>
@@ -1014,11 +1004,22 @@
           <a:p>
             <a:r>
               <a:rPr lang="en-US" dirty="0" smtClean="0"/>
-              <a:t>Variable</a:t>
+              <a:t>We are going to use the swing equation to</a:t>
             </a:r>
             <a:r>
               <a:rPr lang="en-US" baseline="0" dirty="0" smtClean="0"/>
-              <a:t> renewable energy sources like wind and solar do not contribute any rotational inertia. Because of this, when more renewables are incorporated into power systems, the overall system inertia decreases. A decrease in inertia means that the frequency response in the event of a major fault or loss of generation (basically any major power imbalance) will be much more severe because the entire system will react faster when there is less inertia to maintain the frequency. This response will be too quick for the primary frequency response controls and could cause cascading trips and wide spread blackouts. </a:t>
+              <a:t> model the frequency response because it is more accurate than</a:t>
+            </a:r>
+            <a:r>
+              <a:rPr lang="mr-IN" baseline="0" dirty="0" smtClean="0"/>
+              <a:t>…</a:t>
+            </a:r>
+            <a:endParaRPr lang="is-IS" baseline="0" dirty="0" smtClean="0"/>
+          </a:p>
+          <a:p>
+            <a:r>
+              <a:rPr lang="is-IS" baseline="0" dirty="0" smtClean="0"/>
+              <a:t>We are using the aggregated swing equation to adapt the equation to model a whole network. </a:t>
             </a:r>
             <a:endParaRPr lang="en-US" dirty="0"/>
           </a:p>
@@ -1041,7 +1042,7 @@
           <a:p>
             <a:fld id="{063B06ED-AAE6-1643-931F-B078EBBEF119}" type="slidenum">
               <a:rPr lang="en-US" smtClean="0"/>
-              <a:t>10</a:t>
+              <a:t>9</a:t>
             </a:fld>
             <a:endParaRPr lang="en-US"/>
           </a:p>
@@ -1050,7 +1051,7 @@
     </p:spTree>
     <p:extLst>
       <p:ext uri="{BB962C8B-B14F-4D97-AF65-F5344CB8AC3E}">
-        <p14:creationId xmlns:p14="http://schemas.microsoft.com/office/powerpoint/2010/main" val="26804224"/>
+        <p14:creationId xmlns:p14="http://schemas.microsoft.com/office/powerpoint/2010/main" val="132424320"/>
       </p:ext>
     </p:extLst>
   </p:cSld>
@@ -4490,57 +4491,58 @@
           <a:p>
             <a:r>
               <a:rPr lang="en-US" dirty="0" smtClean="0"/>
-              <a:t>Impact of Renewables</a:t>
+              <a:t>Results</a:t>
             </a:r>
             <a:endParaRPr lang="en-US" dirty="0"/>
           </a:p>
         </p:txBody>
       </p:sp>
-      <p:sp>
-        <p:nvSpPr>
-          <p:cNvPr id="3" name="Content Placeholder 2"/>
-          <p:cNvSpPr>
-            <a:spLocks noGrp="1"/>
-          </p:cNvSpPr>
+      <p:pic>
+        <p:nvPicPr>
+          <p:cNvPr id="6" name="Content Placeholder 5"/>
+          <p:cNvPicPr>
+            <a:picLocks noGrp="1" noChangeAspect="1"/>
+          </p:cNvPicPr>
           <p:nvPr>
             <p:ph idx="1"/>
           </p:nvPr>
-        </p:nvSpPr>
-        <p:spPr/>
-        <p:txBody>
-          <a:bodyPr/>
-          <a:lstStyle/>
-          <a:p>
-            <a:r>
-              <a:rPr lang="en-US" dirty="0" smtClean="0"/>
-              <a:t>No inertia (H = 0) </a:t>
-            </a:r>
-          </a:p>
-          <a:p>
-            <a:r>
-              <a:rPr lang="en-US" dirty="0" smtClean="0"/>
-              <a:t>Increased frequency response</a:t>
-            </a:r>
-          </a:p>
-          <a:p>
-            <a:r>
-              <a:rPr lang="en-US" dirty="0" smtClean="0"/>
-              <a:t>Less control</a:t>
-            </a:r>
-            <a:endParaRPr lang="en-US" dirty="0"/>
-          </a:p>
-        </p:txBody>
-      </p:sp>
+        </p:nvPicPr>
+        <p:blipFill>
+          <a:blip r:embed="rId2">
+            <a:extLst>
+              <a:ext uri="{28A0092B-C50C-407E-A947-70E740481C1C}">
+                <a14:useLocalDpi xmlns:a14="http://schemas.microsoft.com/office/drawing/2010/main" val="0"/>
+              </a:ext>
+            </a:extLst>
+          </a:blip>
+          <a:stretch>
+            <a:fillRect/>
+          </a:stretch>
+        </p:blipFill>
+        <p:spPr>
+          <a:xfrm>
+            <a:off x="946404" y="1691322"/>
+            <a:ext cx="6734907" cy="4950069"/>
+          </a:xfrm>
+        </p:spPr>
+      </p:pic>
     </p:spTree>
     <p:extLst>
       <p:ext uri="{BB962C8B-B14F-4D97-AF65-F5344CB8AC3E}">
-        <p14:creationId xmlns:p14="http://schemas.microsoft.com/office/powerpoint/2010/main" val="3602025122"/>
+        <p14:creationId xmlns:p14="http://schemas.microsoft.com/office/powerpoint/2010/main" val="1301709328"/>
       </p:ext>
     </p:extLst>
   </p:cSld>
   <p:clrMapOvr>
     <a:masterClrMapping/>
   </p:clrMapOvr>
+  <p:timing>
+    <p:tnLst>
+      <p:par>
+        <p:cTn id="1" dur="indefinite" restart="never" nodeType="tmRoot"/>
+      </p:par>
+    </p:tnLst>
+  </p:timing>
 </p:sld>
 </file>
 
@@ -4576,29 +4578,458 @@
           <a:bodyPr/>
           <a:lstStyle/>
           <a:p>
-            <a:endParaRPr lang="en-US"/>
-          </a:p>
-        </p:txBody>
-      </p:sp>
-      <p:sp>
-        <p:nvSpPr>
-          <p:cNvPr id="3" name="Content Placeholder 2"/>
-          <p:cNvSpPr>
-            <a:spLocks noGrp="1"/>
-          </p:cNvSpPr>
-          <p:nvPr>
-            <p:ph idx="1"/>
-          </p:nvPr>
-        </p:nvSpPr>
-        <p:spPr/>
-        <p:txBody>
-          <a:bodyPr/>
-          <a:lstStyle/>
-          <a:p>
-            <a:endParaRPr lang="en-US"/>
-          </a:p>
-        </p:txBody>
-      </p:sp>
+            <a:r>
+              <a:rPr lang="en-US" dirty="0" smtClean="0"/>
+              <a:t>Constant Power</a:t>
+            </a:r>
+            <a:endParaRPr lang="en-US" dirty="0"/>
+          </a:p>
+        </p:txBody>
+      </p:sp>
+      <mc:AlternateContent xmlns:mc="http://schemas.openxmlformats.org/markup-compatibility/2006">
+        <mc:Choice xmlns:a14="http://schemas.microsoft.com/office/drawing/2010/main" Requires="a14">
+          <p:sp>
+            <p:nvSpPr>
+              <p:cNvPr id="3" name="Content Placeholder 2"/>
+              <p:cNvSpPr>
+                <a:spLocks noGrp="1"/>
+              </p:cNvSpPr>
+              <p:nvPr>
+                <p:ph idx="1"/>
+              </p:nvPr>
+            </p:nvSpPr>
+            <p:spPr/>
+            <p:txBody>
+              <a:bodyPr/>
+              <a:lstStyle/>
+              <a:p>
+                <a14:m>
+                  <m:oMath xmlns:m="http://schemas.openxmlformats.org/officeDocument/2006/math">
+                    <m:r>
+                      <a:rPr lang="en-US" i="1" smtClean="0">
+                        <a:latin typeface="Cambria Math" charset="0"/>
+                        <a:ea typeface="Cambria Math" charset="0"/>
+                        <a:cs typeface="Cambria Math" charset="0"/>
+                      </a:rPr>
+                      <m:t>∆</m:t>
+                    </m:r>
+                    <m:acc>
+                      <m:accPr>
+                        <m:chr m:val="̇"/>
+                        <m:ctrlPr>
+                          <a:rPr lang="en-US" i="1">
+                            <a:latin typeface="Cambria Math" charset="0"/>
+                            <a:ea typeface="Cambria Math" charset="0"/>
+                            <a:cs typeface="Cambria Math" charset="0"/>
+                          </a:rPr>
+                        </m:ctrlPr>
+                      </m:accPr>
+                      <m:e>
+                        <m:r>
+                          <a:rPr lang="en-US" i="1">
+                            <a:latin typeface="Cambria Math" charset="0"/>
+                            <a:ea typeface="Cambria Math" charset="0"/>
+                            <a:cs typeface="Cambria Math" charset="0"/>
+                          </a:rPr>
+                          <m:t>𝑓</m:t>
+                        </m:r>
+                      </m:e>
+                    </m:acc>
+                    <m:r>
+                      <a:rPr lang="en-US" i="1">
+                        <a:latin typeface="Cambria Math" charset="0"/>
+                        <a:ea typeface="Cambria Math" charset="0"/>
+                        <a:cs typeface="Cambria Math" charset="0"/>
+                      </a:rPr>
+                      <m:t>=−</m:t>
+                    </m:r>
+                    <m:f>
+                      <m:fPr>
+                        <m:ctrlPr>
+                          <a:rPr lang="mr-IN" i="1">
+                            <a:latin typeface="Cambria Math" charset="0"/>
+                            <a:ea typeface="Cambria Math" charset="0"/>
+                            <a:cs typeface="Cambria Math" charset="0"/>
+                          </a:rPr>
+                        </m:ctrlPr>
+                      </m:fPr>
+                      <m:num>
+                        <m:sSub>
+                          <m:sSubPr>
+                            <m:ctrlPr>
+                              <a:rPr lang="en-US" i="1">
+                                <a:latin typeface="Cambria Math" charset="0"/>
+                                <a:ea typeface="Cambria Math" charset="0"/>
+                                <a:cs typeface="Cambria Math" charset="0"/>
+                              </a:rPr>
+                            </m:ctrlPr>
+                          </m:sSubPr>
+                          <m:e>
+                            <m:r>
+                              <a:rPr lang="en-US" i="1">
+                                <a:latin typeface="Cambria Math" charset="0"/>
+                                <a:ea typeface="Cambria Math" charset="0"/>
+                                <a:cs typeface="Cambria Math" charset="0"/>
+                              </a:rPr>
+                              <m:t>𝑓</m:t>
+                            </m:r>
+                          </m:e>
+                          <m:sub>
+                            <m:r>
+                              <a:rPr lang="en-US" i="1">
+                                <a:latin typeface="Cambria Math" charset="0"/>
+                                <a:ea typeface="Cambria Math" charset="0"/>
+                                <a:cs typeface="Cambria Math" charset="0"/>
+                              </a:rPr>
+                              <m:t>0</m:t>
+                            </m:r>
+                          </m:sub>
+                        </m:sSub>
+                      </m:num>
+                      <m:den>
+                        <m:r>
+                          <a:rPr lang="en-US" i="1">
+                            <a:latin typeface="Cambria Math" charset="0"/>
+                            <a:ea typeface="Cambria Math" charset="0"/>
+                            <a:cs typeface="Cambria Math" charset="0"/>
+                          </a:rPr>
+                          <m:t>2</m:t>
+                        </m:r>
+                        <m:r>
+                          <a:rPr lang="en-US" i="1">
+                            <a:latin typeface="Cambria Math" charset="0"/>
+                            <a:ea typeface="Cambria Math" charset="0"/>
+                            <a:cs typeface="Cambria Math" charset="0"/>
+                          </a:rPr>
+                          <m:t>𝐻</m:t>
+                        </m:r>
+                        <m:sSub>
+                          <m:sSubPr>
+                            <m:ctrlPr>
+                              <a:rPr lang="en-US" i="1">
+                                <a:latin typeface="Cambria Math" charset="0"/>
+                                <a:ea typeface="Cambria Math" charset="0"/>
+                                <a:cs typeface="Cambria Math" charset="0"/>
+                              </a:rPr>
+                            </m:ctrlPr>
+                          </m:sSubPr>
+                          <m:e>
+                            <m:r>
+                              <a:rPr lang="en-US" i="1">
+                                <a:latin typeface="Cambria Math" charset="0"/>
+                                <a:ea typeface="Cambria Math" charset="0"/>
+                                <a:cs typeface="Cambria Math" charset="0"/>
+                              </a:rPr>
+                              <m:t>𝑆</m:t>
+                            </m:r>
+                          </m:e>
+                          <m:sub>
+                            <m:r>
+                              <a:rPr lang="en-US" i="1">
+                                <a:latin typeface="Cambria Math" charset="0"/>
+                                <a:ea typeface="Cambria Math" charset="0"/>
+                                <a:cs typeface="Cambria Math" charset="0"/>
+                              </a:rPr>
+                              <m:t>𝐵</m:t>
+                            </m:r>
+                          </m:sub>
+                        </m:sSub>
+                        <m:sSub>
+                          <m:sSubPr>
+                            <m:ctrlPr>
+                              <a:rPr lang="en-US" i="1">
+                                <a:latin typeface="Cambria Math" charset="0"/>
+                                <a:ea typeface="Cambria Math" charset="0"/>
+                                <a:cs typeface="Cambria Math" charset="0"/>
+                              </a:rPr>
+                            </m:ctrlPr>
+                          </m:sSubPr>
+                          <m:e>
+                            <m:r>
+                              <a:rPr lang="en-US" i="1">
+                                <a:latin typeface="Cambria Math" charset="0"/>
+                                <a:ea typeface="Cambria Math" charset="0"/>
+                                <a:cs typeface="Cambria Math" charset="0"/>
+                              </a:rPr>
+                              <m:t>𝐷</m:t>
+                            </m:r>
+                          </m:e>
+                          <m:sub>
+                            <m:r>
+                              <a:rPr lang="en-US" i="1">
+                                <a:latin typeface="Cambria Math" charset="0"/>
+                                <a:ea typeface="Cambria Math" charset="0"/>
+                                <a:cs typeface="Cambria Math" charset="0"/>
+                              </a:rPr>
+                              <m:t>𝑙𝑜𝑎𝑑</m:t>
+                            </m:r>
+                          </m:sub>
+                        </m:sSub>
+                      </m:den>
+                    </m:f>
+                    <m:r>
+                      <a:rPr lang="mr-IN" i="1">
+                        <a:latin typeface="Cambria Math" charset="0"/>
+                        <a:ea typeface="Cambria Math" charset="0"/>
+                        <a:cs typeface="Cambria Math" charset="0"/>
+                      </a:rPr>
+                      <m:t>∆</m:t>
+                    </m:r>
+                    <m:r>
+                      <a:rPr lang="en-US" i="1">
+                        <a:latin typeface="Cambria Math" charset="0"/>
+                        <a:ea typeface="Cambria Math" charset="0"/>
+                        <a:cs typeface="Cambria Math" charset="0"/>
+                      </a:rPr>
+                      <m:t>𝑓</m:t>
+                    </m:r>
+                    <m:r>
+                      <a:rPr lang="en-US" i="1">
+                        <a:latin typeface="Cambria Math" charset="0"/>
+                        <a:ea typeface="Cambria Math" charset="0"/>
+                        <a:cs typeface="Cambria Math" charset="0"/>
+                      </a:rPr>
+                      <m:t>+</m:t>
+                    </m:r>
+                    <m:f>
+                      <m:fPr>
+                        <m:ctrlPr>
+                          <a:rPr lang="mr-IN" i="1">
+                            <a:latin typeface="Cambria Math" charset="0"/>
+                            <a:ea typeface="Cambria Math" charset="0"/>
+                            <a:cs typeface="Cambria Math" charset="0"/>
+                          </a:rPr>
+                        </m:ctrlPr>
+                      </m:fPr>
+                      <m:num>
+                        <m:sSub>
+                          <m:sSubPr>
+                            <m:ctrlPr>
+                              <a:rPr lang="en-US" i="1">
+                                <a:latin typeface="Cambria Math" charset="0"/>
+                                <a:ea typeface="Cambria Math" charset="0"/>
+                                <a:cs typeface="Cambria Math" charset="0"/>
+                              </a:rPr>
+                            </m:ctrlPr>
+                          </m:sSubPr>
+                          <m:e>
+                            <m:r>
+                              <a:rPr lang="en-US" i="1">
+                                <a:latin typeface="Cambria Math" charset="0"/>
+                                <a:ea typeface="Cambria Math" charset="0"/>
+                                <a:cs typeface="Cambria Math" charset="0"/>
+                              </a:rPr>
+                              <m:t>𝑓</m:t>
+                            </m:r>
+                          </m:e>
+                          <m:sub>
+                            <m:r>
+                              <a:rPr lang="en-US" i="1">
+                                <a:latin typeface="Cambria Math" charset="0"/>
+                                <a:ea typeface="Cambria Math" charset="0"/>
+                                <a:cs typeface="Cambria Math" charset="0"/>
+                              </a:rPr>
+                              <m:t>0</m:t>
+                            </m:r>
+                          </m:sub>
+                        </m:sSub>
+                      </m:num>
+                      <m:den>
+                        <m:r>
+                          <a:rPr lang="en-US" i="1">
+                            <a:latin typeface="Cambria Math" charset="0"/>
+                            <a:ea typeface="Cambria Math" charset="0"/>
+                            <a:cs typeface="Cambria Math" charset="0"/>
+                          </a:rPr>
+                          <m:t>2</m:t>
+                        </m:r>
+                        <m:r>
+                          <a:rPr lang="en-US" i="1">
+                            <a:latin typeface="Cambria Math" charset="0"/>
+                            <a:ea typeface="Cambria Math" charset="0"/>
+                            <a:cs typeface="Cambria Math" charset="0"/>
+                          </a:rPr>
+                          <m:t>𝐻</m:t>
+                        </m:r>
+                        <m:sSub>
+                          <m:sSubPr>
+                            <m:ctrlPr>
+                              <a:rPr lang="en-US" i="1">
+                                <a:latin typeface="Cambria Math" charset="0"/>
+                                <a:ea typeface="Cambria Math" charset="0"/>
+                                <a:cs typeface="Cambria Math" charset="0"/>
+                              </a:rPr>
+                            </m:ctrlPr>
+                          </m:sSubPr>
+                          <m:e>
+                            <m:r>
+                              <a:rPr lang="en-US" i="1">
+                                <a:latin typeface="Cambria Math" charset="0"/>
+                                <a:ea typeface="Cambria Math" charset="0"/>
+                                <a:cs typeface="Cambria Math" charset="0"/>
+                              </a:rPr>
+                              <m:t>𝑆</m:t>
+                            </m:r>
+                          </m:e>
+                          <m:sub>
+                            <m:r>
+                              <a:rPr lang="en-US" i="1">
+                                <a:latin typeface="Cambria Math" charset="0"/>
+                                <a:ea typeface="Cambria Math" charset="0"/>
+                                <a:cs typeface="Cambria Math" charset="0"/>
+                              </a:rPr>
+                              <m:t>𝐵</m:t>
+                            </m:r>
+                          </m:sub>
+                        </m:sSub>
+                      </m:den>
+                    </m:f>
+                    <m:r>
+                      <a:rPr lang="en-US" i="1">
+                        <a:latin typeface="Cambria Math" charset="0"/>
+                        <a:ea typeface="Cambria Math" charset="0"/>
+                        <a:cs typeface="Cambria Math" charset="0"/>
+                      </a:rPr>
+                      <m:t>(∆</m:t>
+                    </m:r>
+                    <m:sSub>
+                      <m:sSubPr>
+                        <m:ctrlPr>
+                          <a:rPr lang="en-US" i="1">
+                            <a:latin typeface="Cambria Math" charset="0"/>
+                            <a:ea typeface="Cambria Math" charset="0"/>
+                            <a:cs typeface="Cambria Math" charset="0"/>
+                          </a:rPr>
+                        </m:ctrlPr>
+                      </m:sSubPr>
+                      <m:e>
+                        <m:r>
+                          <a:rPr lang="en-US" i="1">
+                            <a:latin typeface="Cambria Math" charset="0"/>
+                            <a:ea typeface="Cambria Math" charset="0"/>
+                            <a:cs typeface="Cambria Math" charset="0"/>
+                          </a:rPr>
+                          <m:t>𝑃</m:t>
+                        </m:r>
+                      </m:e>
+                      <m:sub>
+                        <m:r>
+                          <a:rPr lang="en-US" i="1">
+                            <a:latin typeface="Cambria Math" charset="0"/>
+                            <a:ea typeface="Cambria Math" charset="0"/>
+                            <a:cs typeface="Cambria Math" charset="0"/>
+                          </a:rPr>
+                          <m:t>𝑚</m:t>
+                        </m:r>
+                      </m:sub>
+                    </m:sSub>
+                    <m:r>
+                      <a:rPr lang="en-US" i="1">
+                        <a:latin typeface="Cambria Math" charset="0"/>
+                        <a:ea typeface="Cambria Math" charset="0"/>
+                        <a:cs typeface="Cambria Math" charset="0"/>
+                      </a:rPr>
+                      <m:t>−∆</m:t>
+                    </m:r>
+                    <m:sSub>
+                      <m:sSubPr>
+                        <m:ctrlPr>
+                          <a:rPr lang="en-US" i="1">
+                            <a:latin typeface="Cambria Math" charset="0"/>
+                            <a:ea typeface="Cambria Math" charset="0"/>
+                            <a:cs typeface="Cambria Math" charset="0"/>
+                          </a:rPr>
+                        </m:ctrlPr>
+                      </m:sSubPr>
+                      <m:e>
+                        <m:r>
+                          <a:rPr lang="en-US" i="1">
+                            <a:latin typeface="Cambria Math" charset="0"/>
+                            <a:ea typeface="Cambria Math" charset="0"/>
+                            <a:cs typeface="Cambria Math" charset="0"/>
+                          </a:rPr>
+                          <m:t>𝑃</m:t>
+                        </m:r>
+                      </m:e>
+                      <m:sub>
+                        <m:r>
+                          <a:rPr lang="en-US" i="1">
+                            <a:latin typeface="Cambria Math" charset="0"/>
+                            <a:ea typeface="Cambria Math" charset="0"/>
+                            <a:cs typeface="Cambria Math" charset="0"/>
+                          </a:rPr>
+                          <m:t>𝑙𝑜𝑎𝑑</m:t>
+                        </m:r>
+                      </m:sub>
+                    </m:sSub>
+                    <m:r>
+                      <a:rPr lang="en-US" b="0" i="1" smtClean="0">
+                        <a:latin typeface="Cambria Math" charset="0"/>
+                        <a:ea typeface="Cambria Math" charset="0"/>
+                        <a:cs typeface="Cambria Math" charset="0"/>
+                      </a:rPr>
+                      <m:t>+</m:t>
+                    </m:r>
+                    <m:r>
+                      <a:rPr lang="en-US" b="0" i="1" smtClean="0">
+                        <a:latin typeface="Cambria Math" charset="0"/>
+                        <a:ea typeface="Cambria Math" charset="0"/>
+                        <a:cs typeface="Cambria Math" charset="0"/>
+                      </a:rPr>
+                      <m:t>𝑞</m:t>
+                    </m:r>
+                    <m:r>
+                      <a:rPr lang="en-US" i="1">
+                        <a:latin typeface="Cambria Math" charset="0"/>
+                        <a:ea typeface="Cambria Math" charset="0"/>
+                        <a:cs typeface="Cambria Math" charset="0"/>
+                      </a:rPr>
+                      <m:t>)</m:t>
+                    </m:r>
+                  </m:oMath>
+                </a14:m>
+                <a:endParaRPr lang="en-US" dirty="0"/>
+              </a:p>
+              <a:p>
+                <a:endParaRPr lang="en-US" dirty="0"/>
+              </a:p>
+            </p:txBody>
+          </p:sp>
+        </mc:Choice>
+        <mc:Fallback>
+          <p:sp>
+            <p:nvSpPr>
+              <p:cNvPr id="3" name="Content Placeholder 2"/>
+              <p:cNvSpPr>
+                <a:spLocks noGrp="1" noRot="1" noChangeAspect="1" noMove="1" noResize="1" noEditPoints="1" noAdjustHandles="1" noChangeArrowheads="1" noChangeShapeType="1" noTextEdit="1"/>
+              </p:cNvSpPr>
+              <p:nvPr>
+                <p:ph idx="1"/>
+              </p:nvPr>
+            </p:nvSpPr>
+            <p:spPr>
+              <a:blipFill rotWithShape="0">
+                <a:blip r:embed="rId2"/>
+                <a:stretch>
+                  <a:fillRect l="-189"/>
+                </a:stretch>
+              </a:blipFill>
+            </p:spPr>
+            <p:txBody>
+              <a:bodyPr/>
+              <a:lstStyle/>
+              <a:p>
+                <a:r>
+                  <a:rPr lang="en-US">
+                    <a:noFill/>
+                  </a:rPr>
+                  <a:t> </a:t>
+                </a:r>
+              </a:p>
+            </p:txBody>
+          </p:sp>
+        </mc:Fallback>
+      </mc:AlternateContent>
     </p:spTree>
     <p:extLst>
       <p:ext uri="{BB962C8B-B14F-4D97-AF65-F5344CB8AC3E}">
@@ -4609,6 +5040,13 @@
   <p:clrMapOvr>
     <a:masterClrMapping/>
   </p:clrMapOvr>
+  <p:timing>
+    <p:tnLst>
+      <p:par>
+        <p:cTn id="1" dur="indefinite" restart="never" nodeType="tmRoot"/>
+      </p:par>
+    </p:tnLst>
+  </p:timing>
 </p:sld>
 </file>
 
@@ -4646,54 +5084,660 @@
           <a:p>
             <a:r>
               <a:rPr lang="en-US" dirty="0" smtClean="0"/>
-              <a:t>Proposed Methods</a:t>
+              <a:t>Droop Control</a:t>
             </a:r>
             <a:endParaRPr lang="en-US" dirty="0"/>
           </a:p>
         </p:txBody>
       </p:sp>
-      <p:sp>
-        <p:nvSpPr>
-          <p:cNvPr id="3" name="Content Placeholder 2"/>
-          <p:cNvSpPr>
-            <a:spLocks noGrp="1"/>
-          </p:cNvSpPr>
-          <p:nvPr>
-            <p:ph idx="1"/>
-          </p:nvPr>
-        </p:nvSpPr>
-        <p:spPr/>
-        <p:txBody>
-          <a:bodyPr/>
-          <a:lstStyle/>
-          <a:p>
-            <a:r>
-              <a:rPr lang="en-US" dirty="0" smtClean="0"/>
-              <a:t>Synthetic or Virtual Inertia</a:t>
-            </a:r>
-          </a:p>
-          <a:p>
-            <a:r>
-              <a:rPr lang="en-US" dirty="0" smtClean="0"/>
-              <a:t>Energy Storage Systems</a:t>
-            </a:r>
-          </a:p>
-          <a:p>
-            <a:r>
-              <a:rPr lang="en-US" dirty="0" err="1" smtClean="0"/>
-              <a:t>Deloading</a:t>
-            </a:r>
-            <a:endParaRPr lang="en-US" dirty="0" smtClean="0"/>
-          </a:p>
-          <a:p>
-            <a:endParaRPr lang="en-US" dirty="0" smtClean="0"/>
-          </a:p>
-        </p:txBody>
-      </p:sp>
+      <mc:AlternateContent xmlns:mc="http://schemas.openxmlformats.org/markup-compatibility/2006">
+        <mc:Choice xmlns:a14="http://schemas.microsoft.com/office/drawing/2010/main" Requires="a14">
+          <p:sp>
+            <p:nvSpPr>
+              <p:cNvPr id="3" name="Content Placeholder 2"/>
+              <p:cNvSpPr>
+                <a:spLocks noGrp="1"/>
+              </p:cNvSpPr>
+              <p:nvPr>
+                <p:ph idx="1"/>
+              </p:nvPr>
+            </p:nvSpPr>
+            <p:spPr/>
+            <p:txBody>
+              <a:bodyPr/>
+              <a:lstStyle/>
+              <a:p>
+                <a:pPr>
+                  <a:lnSpc>
+                    <a:spcPct val="100000"/>
+                  </a:lnSpc>
+                </a:pPr>
+                <a:r>
+                  <a:rPr lang="en-US" dirty="0" smtClean="0">
+                    <a:ea typeface="Cambria Math" charset="0"/>
+                    <a:cs typeface="Cambria Math" charset="0"/>
+                  </a:rPr>
+                  <a:t>Control Variable:</a:t>
+                </a:r>
+              </a:p>
+              <a:p>
+                <a:pPr marL="0" indent="0">
+                  <a:lnSpc>
+                    <a:spcPct val="100000"/>
+                  </a:lnSpc>
+                  <a:buNone/>
+                </a:pPr>
+                <a14:m>
+                  <m:oMathPara xmlns:m="http://schemas.openxmlformats.org/officeDocument/2006/math">
+                    <m:oMathParaPr>
+                      <m:jc m:val="centerGroup"/>
+                    </m:oMathParaPr>
+                    <m:oMath xmlns:m="http://schemas.openxmlformats.org/officeDocument/2006/math">
+                      <m:r>
+                        <a:rPr lang="en-US" b="0" i="1" smtClean="0">
+                          <a:latin typeface="Cambria Math" charset="0"/>
+                          <a:ea typeface="Cambria Math" charset="0"/>
+                          <a:cs typeface="Cambria Math" charset="0"/>
+                        </a:rPr>
+                        <m:t>𝑢</m:t>
+                      </m:r>
+                      <m:r>
+                        <a:rPr lang="en-US" b="0" i="1" smtClean="0">
+                          <a:latin typeface="Cambria Math" charset="0"/>
+                          <a:ea typeface="Cambria Math" charset="0"/>
+                          <a:cs typeface="Cambria Math" charset="0"/>
+                        </a:rPr>
+                        <m:t>=</m:t>
+                      </m:r>
+                      <m:r>
+                        <a:rPr lang="en-US" b="0" i="1" smtClean="0">
+                          <a:latin typeface="Cambria Math" charset="0"/>
+                          <a:ea typeface="Cambria Math" charset="0"/>
+                          <a:cs typeface="Cambria Math" charset="0"/>
+                        </a:rPr>
+                        <m:t>𝑞</m:t>
+                      </m:r>
+                      <m:r>
+                        <a:rPr lang="en-US" b="0" i="1" smtClean="0">
+                          <a:latin typeface="Cambria Math" charset="0"/>
+                          <a:ea typeface="Cambria Math" charset="0"/>
+                          <a:cs typeface="Cambria Math" charset="0"/>
+                        </a:rPr>
+                        <m:t>−</m:t>
+                      </m:r>
+                      <m:f>
+                        <m:fPr>
+                          <m:ctrlPr>
+                            <a:rPr lang="mr-IN" b="0" i="1" smtClean="0">
+                              <a:latin typeface="Cambria Math" charset="0"/>
+                              <a:ea typeface="Cambria Math" charset="0"/>
+                              <a:cs typeface="Cambria Math" charset="0"/>
+                            </a:rPr>
+                          </m:ctrlPr>
+                        </m:fPr>
+                        <m:num>
+                          <m:r>
+                            <a:rPr lang="en-US" b="0" i="1" smtClean="0">
+                              <a:latin typeface="Cambria Math" charset="0"/>
+                              <a:ea typeface="Cambria Math" charset="0"/>
+                              <a:cs typeface="Cambria Math" charset="0"/>
+                            </a:rPr>
+                            <m:t>1</m:t>
+                          </m:r>
+                        </m:num>
+                        <m:den>
+                          <m:r>
+                            <a:rPr lang="en-US" b="0" i="1" smtClean="0">
+                              <a:latin typeface="Cambria Math" charset="0"/>
+                              <a:ea typeface="Cambria Math" charset="0"/>
+                              <a:cs typeface="Cambria Math" charset="0"/>
+                            </a:rPr>
+                            <m:t>𝑅</m:t>
+                          </m:r>
+                        </m:den>
+                      </m:f>
+                      <m:r>
+                        <a:rPr lang="mr-IN" b="0" i="1" smtClean="0">
+                          <a:latin typeface="Cambria Math" charset="0"/>
+                          <a:ea typeface="Cambria Math" charset="0"/>
+                          <a:cs typeface="Cambria Math" charset="0"/>
+                        </a:rPr>
+                        <m:t>∆</m:t>
+                      </m:r>
+                      <m:r>
+                        <a:rPr lang="en-US" b="0" i="1" smtClean="0">
+                          <a:latin typeface="Cambria Math" charset="0"/>
+                          <a:ea typeface="Cambria Math" charset="0"/>
+                          <a:cs typeface="Cambria Math" charset="0"/>
+                        </a:rPr>
+                        <m:t>𝑓</m:t>
+                      </m:r>
+                    </m:oMath>
+                  </m:oMathPara>
+                </a14:m>
+                <a:endParaRPr lang="en-US" i="1" dirty="0" smtClean="0">
+                  <a:latin typeface="Cambria Math" charset="0"/>
+                  <a:ea typeface="Cambria Math" charset="0"/>
+                  <a:cs typeface="Cambria Math" charset="0"/>
+                </a:endParaRPr>
+              </a:p>
+              <a:p>
+                <a:pPr>
+                  <a:lnSpc>
+                    <a:spcPct val="100000"/>
+                  </a:lnSpc>
+                </a:pPr>
+                <a:r>
+                  <a:rPr lang="en-US" dirty="0" smtClean="0">
+                    <a:ea typeface="Cambria Math" charset="0"/>
+                    <a:cs typeface="Cambria Math" charset="0"/>
+                  </a:rPr>
+                  <a:t>Swing Equation:</a:t>
+                </a:r>
+              </a:p>
+              <a:p>
+                <a:pPr marL="0" indent="0">
+                  <a:lnSpc>
+                    <a:spcPct val="100000"/>
+                  </a:lnSpc>
+                  <a:buNone/>
+                </a:pPr>
+                <a14:m>
+                  <m:oMathPara xmlns:m="http://schemas.openxmlformats.org/officeDocument/2006/math">
+                    <m:oMathParaPr>
+                      <m:jc m:val="centerGroup"/>
+                    </m:oMathParaPr>
+                    <m:oMath xmlns:m="http://schemas.openxmlformats.org/officeDocument/2006/math">
+                      <m:r>
+                        <a:rPr lang="en-US" i="1" smtClean="0">
+                          <a:latin typeface="Cambria Math" charset="0"/>
+                          <a:ea typeface="Cambria Math" charset="0"/>
+                          <a:cs typeface="Cambria Math" charset="0"/>
+                        </a:rPr>
+                        <m:t>∆</m:t>
+                      </m:r>
+                      <m:acc>
+                        <m:accPr>
+                          <m:chr m:val="̇"/>
+                          <m:ctrlPr>
+                            <a:rPr lang="en-US" i="1">
+                              <a:latin typeface="Cambria Math" charset="0"/>
+                              <a:ea typeface="Cambria Math" charset="0"/>
+                              <a:cs typeface="Cambria Math" charset="0"/>
+                            </a:rPr>
+                          </m:ctrlPr>
+                        </m:accPr>
+                        <m:e>
+                          <m:r>
+                            <a:rPr lang="en-US" i="1">
+                              <a:latin typeface="Cambria Math" charset="0"/>
+                              <a:ea typeface="Cambria Math" charset="0"/>
+                              <a:cs typeface="Cambria Math" charset="0"/>
+                            </a:rPr>
+                            <m:t>𝑓</m:t>
+                          </m:r>
+                        </m:e>
+                      </m:acc>
+                      <m:r>
+                        <a:rPr lang="en-US" i="1">
+                          <a:latin typeface="Cambria Math" charset="0"/>
+                          <a:ea typeface="Cambria Math" charset="0"/>
+                          <a:cs typeface="Cambria Math" charset="0"/>
+                        </a:rPr>
+                        <m:t>=−</m:t>
+                      </m:r>
+                      <m:f>
+                        <m:fPr>
+                          <m:ctrlPr>
+                            <a:rPr lang="mr-IN" i="1">
+                              <a:latin typeface="Cambria Math" charset="0"/>
+                              <a:ea typeface="Cambria Math" charset="0"/>
+                              <a:cs typeface="Cambria Math" charset="0"/>
+                            </a:rPr>
+                          </m:ctrlPr>
+                        </m:fPr>
+                        <m:num>
+                          <m:sSub>
+                            <m:sSubPr>
+                              <m:ctrlPr>
+                                <a:rPr lang="en-US" i="1">
+                                  <a:latin typeface="Cambria Math" charset="0"/>
+                                  <a:ea typeface="Cambria Math" charset="0"/>
+                                  <a:cs typeface="Cambria Math" charset="0"/>
+                                </a:rPr>
+                              </m:ctrlPr>
+                            </m:sSubPr>
+                            <m:e>
+                              <m:r>
+                                <a:rPr lang="en-US" i="1">
+                                  <a:latin typeface="Cambria Math" charset="0"/>
+                                  <a:ea typeface="Cambria Math" charset="0"/>
+                                  <a:cs typeface="Cambria Math" charset="0"/>
+                                </a:rPr>
+                                <m:t>𝑓</m:t>
+                              </m:r>
+                            </m:e>
+                            <m:sub>
+                              <m:r>
+                                <a:rPr lang="en-US" i="1">
+                                  <a:latin typeface="Cambria Math" charset="0"/>
+                                  <a:ea typeface="Cambria Math" charset="0"/>
+                                  <a:cs typeface="Cambria Math" charset="0"/>
+                                </a:rPr>
+                                <m:t>0</m:t>
+                              </m:r>
+                            </m:sub>
+                          </m:sSub>
+                        </m:num>
+                        <m:den>
+                          <m:r>
+                            <a:rPr lang="en-US" i="1">
+                              <a:latin typeface="Cambria Math" charset="0"/>
+                              <a:ea typeface="Cambria Math" charset="0"/>
+                              <a:cs typeface="Cambria Math" charset="0"/>
+                            </a:rPr>
+                            <m:t>2</m:t>
+                          </m:r>
+                          <m:r>
+                            <a:rPr lang="en-US" i="1">
+                              <a:latin typeface="Cambria Math" charset="0"/>
+                              <a:ea typeface="Cambria Math" charset="0"/>
+                              <a:cs typeface="Cambria Math" charset="0"/>
+                            </a:rPr>
+                            <m:t>𝐻</m:t>
+                          </m:r>
+                          <m:sSub>
+                            <m:sSubPr>
+                              <m:ctrlPr>
+                                <a:rPr lang="en-US" i="1">
+                                  <a:latin typeface="Cambria Math" charset="0"/>
+                                  <a:ea typeface="Cambria Math" charset="0"/>
+                                  <a:cs typeface="Cambria Math" charset="0"/>
+                                </a:rPr>
+                              </m:ctrlPr>
+                            </m:sSubPr>
+                            <m:e>
+                              <m:r>
+                                <a:rPr lang="en-US" i="1">
+                                  <a:latin typeface="Cambria Math" charset="0"/>
+                                  <a:ea typeface="Cambria Math" charset="0"/>
+                                  <a:cs typeface="Cambria Math" charset="0"/>
+                                </a:rPr>
+                                <m:t>𝑆</m:t>
+                              </m:r>
+                            </m:e>
+                            <m:sub>
+                              <m:r>
+                                <a:rPr lang="en-US" i="1">
+                                  <a:latin typeface="Cambria Math" charset="0"/>
+                                  <a:ea typeface="Cambria Math" charset="0"/>
+                                  <a:cs typeface="Cambria Math" charset="0"/>
+                                </a:rPr>
+                                <m:t>𝐵</m:t>
+                              </m:r>
+                            </m:sub>
+                          </m:sSub>
+                          <m:sSub>
+                            <m:sSubPr>
+                              <m:ctrlPr>
+                                <a:rPr lang="en-US" i="1">
+                                  <a:latin typeface="Cambria Math" charset="0"/>
+                                  <a:ea typeface="Cambria Math" charset="0"/>
+                                  <a:cs typeface="Cambria Math" charset="0"/>
+                                </a:rPr>
+                              </m:ctrlPr>
+                            </m:sSubPr>
+                            <m:e>
+                              <m:r>
+                                <a:rPr lang="en-US" i="1">
+                                  <a:latin typeface="Cambria Math" charset="0"/>
+                                  <a:ea typeface="Cambria Math" charset="0"/>
+                                  <a:cs typeface="Cambria Math" charset="0"/>
+                                </a:rPr>
+                                <m:t>𝐷</m:t>
+                              </m:r>
+                            </m:e>
+                            <m:sub>
+                              <m:r>
+                                <a:rPr lang="en-US" i="1">
+                                  <a:latin typeface="Cambria Math" charset="0"/>
+                                  <a:ea typeface="Cambria Math" charset="0"/>
+                                  <a:cs typeface="Cambria Math" charset="0"/>
+                                </a:rPr>
+                                <m:t>𝑙𝑜𝑎𝑑</m:t>
+                              </m:r>
+                            </m:sub>
+                          </m:sSub>
+                        </m:den>
+                      </m:f>
+                      <m:r>
+                        <a:rPr lang="mr-IN" i="1">
+                          <a:latin typeface="Cambria Math" charset="0"/>
+                          <a:ea typeface="Cambria Math" charset="0"/>
+                          <a:cs typeface="Cambria Math" charset="0"/>
+                        </a:rPr>
+                        <m:t>∆</m:t>
+                      </m:r>
+                      <m:r>
+                        <a:rPr lang="en-US" i="1">
+                          <a:latin typeface="Cambria Math" charset="0"/>
+                          <a:ea typeface="Cambria Math" charset="0"/>
+                          <a:cs typeface="Cambria Math" charset="0"/>
+                        </a:rPr>
+                        <m:t>𝑓</m:t>
+                      </m:r>
+                      <m:r>
+                        <a:rPr lang="en-US" i="1">
+                          <a:latin typeface="Cambria Math" charset="0"/>
+                          <a:ea typeface="Cambria Math" charset="0"/>
+                          <a:cs typeface="Cambria Math" charset="0"/>
+                        </a:rPr>
+                        <m:t>+</m:t>
+                      </m:r>
+                      <m:f>
+                        <m:fPr>
+                          <m:ctrlPr>
+                            <a:rPr lang="mr-IN" i="1">
+                              <a:latin typeface="Cambria Math" charset="0"/>
+                              <a:ea typeface="Cambria Math" charset="0"/>
+                              <a:cs typeface="Cambria Math" charset="0"/>
+                            </a:rPr>
+                          </m:ctrlPr>
+                        </m:fPr>
+                        <m:num>
+                          <m:sSub>
+                            <m:sSubPr>
+                              <m:ctrlPr>
+                                <a:rPr lang="en-US" i="1">
+                                  <a:latin typeface="Cambria Math" charset="0"/>
+                                  <a:ea typeface="Cambria Math" charset="0"/>
+                                  <a:cs typeface="Cambria Math" charset="0"/>
+                                </a:rPr>
+                              </m:ctrlPr>
+                            </m:sSubPr>
+                            <m:e>
+                              <m:r>
+                                <a:rPr lang="en-US" i="1">
+                                  <a:latin typeface="Cambria Math" charset="0"/>
+                                  <a:ea typeface="Cambria Math" charset="0"/>
+                                  <a:cs typeface="Cambria Math" charset="0"/>
+                                </a:rPr>
+                                <m:t>𝑓</m:t>
+                              </m:r>
+                            </m:e>
+                            <m:sub>
+                              <m:r>
+                                <a:rPr lang="en-US" i="1">
+                                  <a:latin typeface="Cambria Math" charset="0"/>
+                                  <a:ea typeface="Cambria Math" charset="0"/>
+                                  <a:cs typeface="Cambria Math" charset="0"/>
+                                </a:rPr>
+                                <m:t>0</m:t>
+                              </m:r>
+                            </m:sub>
+                          </m:sSub>
+                        </m:num>
+                        <m:den>
+                          <m:r>
+                            <a:rPr lang="en-US" i="1">
+                              <a:latin typeface="Cambria Math" charset="0"/>
+                              <a:ea typeface="Cambria Math" charset="0"/>
+                              <a:cs typeface="Cambria Math" charset="0"/>
+                            </a:rPr>
+                            <m:t>2</m:t>
+                          </m:r>
+                          <m:r>
+                            <a:rPr lang="en-US" i="1">
+                              <a:latin typeface="Cambria Math" charset="0"/>
+                              <a:ea typeface="Cambria Math" charset="0"/>
+                              <a:cs typeface="Cambria Math" charset="0"/>
+                            </a:rPr>
+                            <m:t>𝐻</m:t>
+                          </m:r>
+                          <m:sSub>
+                            <m:sSubPr>
+                              <m:ctrlPr>
+                                <a:rPr lang="en-US" i="1">
+                                  <a:latin typeface="Cambria Math" charset="0"/>
+                                  <a:ea typeface="Cambria Math" charset="0"/>
+                                  <a:cs typeface="Cambria Math" charset="0"/>
+                                </a:rPr>
+                              </m:ctrlPr>
+                            </m:sSubPr>
+                            <m:e>
+                              <m:r>
+                                <a:rPr lang="en-US" i="1">
+                                  <a:latin typeface="Cambria Math" charset="0"/>
+                                  <a:ea typeface="Cambria Math" charset="0"/>
+                                  <a:cs typeface="Cambria Math" charset="0"/>
+                                </a:rPr>
+                                <m:t>𝑆</m:t>
+                              </m:r>
+                            </m:e>
+                            <m:sub>
+                              <m:r>
+                                <a:rPr lang="en-US" i="1">
+                                  <a:latin typeface="Cambria Math" charset="0"/>
+                                  <a:ea typeface="Cambria Math" charset="0"/>
+                                  <a:cs typeface="Cambria Math" charset="0"/>
+                                </a:rPr>
+                                <m:t>𝐵</m:t>
+                              </m:r>
+                            </m:sub>
+                          </m:sSub>
+                        </m:den>
+                      </m:f>
+                      <m:r>
+                        <a:rPr lang="en-US" i="1">
+                          <a:latin typeface="Cambria Math" charset="0"/>
+                          <a:ea typeface="Cambria Math" charset="0"/>
+                          <a:cs typeface="Cambria Math" charset="0"/>
+                        </a:rPr>
+                        <m:t>(∆</m:t>
+                      </m:r>
+                      <m:sSub>
+                        <m:sSubPr>
+                          <m:ctrlPr>
+                            <a:rPr lang="en-US" i="1">
+                              <a:latin typeface="Cambria Math" charset="0"/>
+                              <a:ea typeface="Cambria Math" charset="0"/>
+                              <a:cs typeface="Cambria Math" charset="0"/>
+                            </a:rPr>
+                          </m:ctrlPr>
+                        </m:sSubPr>
+                        <m:e>
+                          <m:r>
+                            <a:rPr lang="en-US" i="1">
+                              <a:latin typeface="Cambria Math" charset="0"/>
+                              <a:ea typeface="Cambria Math" charset="0"/>
+                              <a:cs typeface="Cambria Math" charset="0"/>
+                            </a:rPr>
+                            <m:t>𝑃</m:t>
+                          </m:r>
+                        </m:e>
+                        <m:sub>
+                          <m:r>
+                            <a:rPr lang="en-US" i="1">
+                              <a:latin typeface="Cambria Math" charset="0"/>
+                              <a:ea typeface="Cambria Math" charset="0"/>
+                              <a:cs typeface="Cambria Math" charset="0"/>
+                            </a:rPr>
+                            <m:t>𝑚</m:t>
+                          </m:r>
+                        </m:sub>
+                      </m:sSub>
+                      <m:r>
+                        <a:rPr lang="en-US" i="1">
+                          <a:latin typeface="Cambria Math" charset="0"/>
+                          <a:ea typeface="Cambria Math" charset="0"/>
+                          <a:cs typeface="Cambria Math" charset="0"/>
+                        </a:rPr>
+                        <m:t>−∆</m:t>
+                      </m:r>
+                      <m:sSub>
+                        <m:sSubPr>
+                          <m:ctrlPr>
+                            <a:rPr lang="en-US" i="1">
+                              <a:latin typeface="Cambria Math" charset="0"/>
+                              <a:ea typeface="Cambria Math" charset="0"/>
+                              <a:cs typeface="Cambria Math" charset="0"/>
+                            </a:rPr>
+                          </m:ctrlPr>
+                        </m:sSubPr>
+                        <m:e>
+                          <m:r>
+                            <a:rPr lang="en-US" i="1">
+                              <a:latin typeface="Cambria Math" charset="0"/>
+                              <a:ea typeface="Cambria Math" charset="0"/>
+                              <a:cs typeface="Cambria Math" charset="0"/>
+                            </a:rPr>
+                            <m:t>𝑃</m:t>
+                          </m:r>
+                        </m:e>
+                        <m:sub>
+                          <m:r>
+                            <a:rPr lang="en-US" i="1">
+                              <a:latin typeface="Cambria Math" charset="0"/>
+                              <a:ea typeface="Cambria Math" charset="0"/>
+                              <a:cs typeface="Cambria Math" charset="0"/>
+                            </a:rPr>
+                            <m:t>𝑙𝑜𝑎𝑑</m:t>
+                          </m:r>
+                        </m:sub>
+                      </m:sSub>
+                      <m:r>
+                        <a:rPr lang="en-US" i="1">
+                          <a:latin typeface="Cambria Math" charset="0"/>
+                          <a:ea typeface="Cambria Math" charset="0"/>
+                          <a:cs typeface="Cambria Math" charset="0"/>
+                        </a:rPr>
+                        <m:t>+</m:t>
+                      </m:r>
+                      <m:r>
+                        <a:rPr lang="en-US" i="1">
+                          <a:latin typeface="Cambria Math" charset="0"/>
+                          <a:ea typeface="Cambria Math" charset="0"/>
+                          <a:cs typeface="Cambria Math" charset="0"/>
+                        </a:rPr>
+                        <m:t>𝑞</m:t>
+                      </m:r>
+                      <m:r>
+                        <a:rPr lang="en-US" b="0" i="1" smtClean="0">
+                          <a:latin typeface="Cambria Math" charset="0"/>
+                          <a:ea typeface="Cambria Math" charset="0"/>
+                          <a:cs typeface="Cambria Math" charset="0"/>
+                        </a:rPr>
+                        <m:t> − </m:t>
+                      </m:r>
+                      <m:f>
+                        <m:fPr>
+                          <m:ctrlPr>
+                            <a:rPr lang="mr-IN" b="0" i="1" smtClean="0">
+                              <a:latin typeface="Cambria Math" charset="0"/>
+                              <a:ea typeface="Cambria Math" charset="0"/>
+                              <a:cs typeface="Cambria Math" charset="0"/>
+                            </a:rPr>
+                          </m:ctrlPr>
+                        </m:fPr>
+                        <m:num>
+                          <m:r>
+                            <a:rPr lang="en-US" b="0" i="1" smtClean="0">
+                              <a:latin typeface="Cambria Math" charset="0"/>
+                              <a:ea typeface="Cambria Math" charset="0"/>
+                              <a:cs typeface="Cambria Math" charset="0"/>
+                            </a:rPr>
+                            <m:t>1</m:t>
+                          </m:r>
+                        </m:num>
+                        <m:den>
+                          <m:r>
+                            <a:rPr lang="en-US" b="0" i="1" smtClean="0">
+                              <a:latin typeface="Cambria Math" charset="0"/>
+                              <a:ea typeface="Cambria Math" charset="0"/>
+                              <a:cs typeface="Cambria Math" charset="0"/>
+                            </a:rPr>
+                            <m:t>𝑅</m:t>
+                          </m:r>
+                        </m:den>
+                      </m:f>
+                      <m:r>
+                        <a:rPr lang="mr-IN" b="0" i="1" smtClean="0">
+                          <a:latin typeface="Cambria Math" charset="0"/>
+                          <a:ea typeface="Cambria Math" charset="0"/>
+                          <a:cs typeface="Cambria Math" charset="0"/>
+                        </a:rPr>
+                        <m:t>∆</m:t>
+                      </m:r>
+                      <m:r>
+                        <a:rPr lang="en-US" b="0" i="1" smtClean="0">
+                          <a:latin typeface="Cambria Math" charset="0"/>
+                          <a:ea typeface="Cambria Math" charset="0"/>
+                          <a:cs typeface="Cambria Math" charset="0"/>
+                        </a:rPr>
+                        <m:t>𝑓</m:t>
+                      </m:r>
+                      <m:r>
+                        <a:rPr lang="en-US" i="1">
+                          <a:latin typeface="Cambria Math" charset="0"/>
+                          <a:ea typeface="Cambria Math" charset="0"/>
+                          <a:cs typeface="Cambria Math" charset="0"/>
+                        </a:rPr>
+                        <m:t>)</m:t>
+                      </m:r>
+                    </m:oMath>
+                  </m:oMathPara>
+                </a14:m>
+                <a:endParaRPr lang="en-US" dirty="0"/>
+              </a:p>
+              <a:p>
+                <a:pPr>
+                  <a:lnSpc>
+                    <a:spcPct val="100000"/>
+                  </a:lnSpc>
+                </a:pPr>
+                <a:endParaRPr lang="en-US" dirty="0"/>
+              </a:p>
+            </p:txBody>
+          </p:sp>
+        </mc:Choice>
+        <mc:Fallback>
+          <p:sp>
+            <p:nvSpPr>
+              <p:cNvPr id="3" name="Content Placeholder 2"/>
+              <p:cNvSpPr>
+                <a:spLocks noGrp="1" noRot="1" noChangeAspect="1" noMove="1" noResize="1" noEditPoints="1" noAdjustHandles="1" noChangeArrowheads="1" noChangeShapeType="1" noTextEdit="1"/>
+              </p:cNvSpPr>
+              <p:nvPr>
+                <p:ph idx="1"/>
+              </p:nvPr>
+            </p:nvSpPr>
+            <p:spPr>
+              <a:blipFill rotWithShape="0">
+                <a:blip r:embed="rId2"/>
+                <a:stretch>
+                  <a:fillRect l="-189" t="-700"/>
+                </a:stretch>
+              </a:blipFill>
+            </p:spPr>
+            <p:txBody>
+              <a:bodyPr/>
+              <a:lstStyle/>
+              <a:p>
+                <a:r>
+                  <a:rPr lang="en-US">
+                    <a:noFill/>
+                  </a:rPr>
+                  <a:t> </a:t>
+                </a:r>
+              </a:p>
+            </p:txBody>
+          </p:sp>
+        </mc:Fallback>
+      </mc:AlternateContent>
     </p:spTree>
     <p:extLst>
       <p:ext uri="{BB962C8B-B14F-4D97-AF65-F5344CB8AC3E}">
-        <p14:creationId xmlns:p14="http://schemas.microsoft.com/office/powerpoint/2010/main" val="1775937893"/>
+        <p14:creationId xmlns:p14="http://schemas.microsoft.com/office/powerpoint/2010/main" val="1895126121"/>
       </p:ext>
     </p:extLst>
   </p:cSld>
@@ -4737,7 +5781,7 @@
           <a:p>
             <a:r>
               <a:rPr lang="en-US" dirty="0" smtClean="0"/>
-              <a:t>Virtual Inertia</a:t>
+              <a:t>Proposed Methods</a:t>
             </a:r>
             <a:endParaRPr lang="en-US" dirty="0"/>
           </a:p>
@@ -4760,22 +5804,31 @@
           <a:p>
             <a:r>
               <a:rPr lang="en-US" dirty="0" smtClean="0"/>
-              <a:t>Pros: Increases overall inertia</a:t>
+              <a:t>Synthetic or Virtual Inertia</a:t>
             </a:r>
           </a:p>
           <a:p>
             <a:r>
               <a:rPr lang="en-US" dirty="0" smtClean="0"/>
-              <a:t>Cons: High cost to update all facilities with the necessary control mechanisms</a:t>
-            </a:r>
-            <a:endParaRPr lang="en-US" dirty="0"/>
+              <a:t>Energy Storage Systems</a:t>
+            </a:r>
+          </a:p>
+          <a:p>
+            <a:r>
+              <a:rPr lang="en-US" dirty="0" err="1" smtClean="0"/>
+              <a:t>Deloading</a:t>
+            </a:r>
+            <a:endParaRPr lang="en-US" dirty="0" smtClean="0"/>
+          </a:p>
+          <a:p>
+            <a:endParaRPr lang="en-US" dirty="0" smtClean="0"/>
           </a:p>
         </p:txBody>
       </p:sp>
     </p:spTree>
     <p:extLst>
       <p:ext uri="{BB962C8B-B14F-4D97-AF65-F5344CB8AC3E}">
-        <p14:creationId xmlns:p14="http://schemas.microsoft.com/office/powerpoint/2010/main" val="708870289"/>
+        <p14:creationId xmlns:p14="http://schemas.microsoft.com/office/powerpoint/2010/main" val="1775937893"/>
       </p:ext>
     </p:extLst>
   </p:cSld>
@@ -4819,7 +5872,7 @@
           <a:p>
             <a:r>
               <a:rPr lang="en-US" dirty="0" smtClean="0"/>
-              <a:t>Energy Storage Systems</a:t>
+              <a:t>Virtual Inertia</a:t>
             </a:r>
             <a:endParaRPr lang="en-US" dirty="0"/>
           </a:p>
@@ -4842,16 +5895,14 @@
           <a:p>
             <a:r>
               <a:rPr lang="en-US" dirty="0" smtClean="0"/>
-              <a:t>Pros: Provides reserve power</a:t>
+              <a:t>Pros: Increases overall inertia</a:t>
             </a:r>
           </a:p>
           <a:p>
             <a:r>
               <a:rPr lang="en-US" dirty="0" smtClean="0"/>
-              <a:t>Cons: Costly</a:t>
-            </a:r>
-          </a:p>
-          <a:p>
+              <a:t>Cons: High cost to update all facilities with the necessary control mechanisms</a:t>
+            </a:r>
             <a:endParaRPr lang="en-US" dirty="0"/>
           </a:p>
         </p:txBody>
@@ -4859,7 +5910,7 @@
     </p:spTree>
     <p:extLst>
       <p:ext uri="{BB962C8B-B14F-4D97-AF65-F5344CB8AC3E}">
-        <p14:creationId xmlns:p14="http://schemas.microsoft.com/office/powerpoint/2010/main" val="1818619930"/>
+        <p14:creationId xmlns:p14="http://schemas.microsoft.com/office/powerpoint/2010/main" val="708870289"/>
       </p:ext>
     </p:extLst>
   </p:cSld>
@@ -4902,6 +5953,90 @@
           <a:lstStyle/>
           <a:p>
             <a:r>
+              <a:rPr lang="en-US" dirty="0" smtClean="0"/>
+              <a:t>Energy Storage Systems</a:t>
+            </a:r>
+            <a:endParaRPr lang="en-US" dirty="0"/>
+          </a:p>
+        </p:txBody>
+      </p:sp>
+      <p:sp>
+        <p:nvSpPr>
+          <p:cNvPr id="3" name="Content Placeholder 2"/>
+          <p:cNvSpPr>
+            <a:spLocks noGrp="1"/>
+          </p:cNvSpPr>
+          <p:nvPr>
+            <p:ph idx="1"/>
+          </p:nvPr>
+        </p:nvSpPr>
+        <p:spPr/>
+        <p:txBody>
+          <a:bodyPr/>
+          <a:lstStyle/>
+          <a:p>
+            <a:r>
+              <a:rPr lang="en-US" dirty="0" smtClean="0"/>
+              <a:t>Pros: Provides reserve power</a:t>
+            </a:r>
+          </a:p>
+          <a:p>
+            <a:r>
+              <a:rPr lang="en-US" dirty="0" smtClean="0"/>
+              <a:t>Cons: Costly</a:t>
+            </a:r>
+          </a:p>
+          <a:p>
+            <a:endParaRPr lang="en-US" dirty="0"/>
+          </a:p>
+        </p:txBody>
+      </p:sp>
+    </p:spTree>
+    <p:extLst>
+      <p:ext uri="{BB962C8B-B14F-4D97-AF65-F5344CB8AC3E}">
+        <p14:creationId xmlns:p14="http://schemas.microsoft.com/office/powerpoint/2010/main" val="1818619930"/>
+      </p:ext>
+    </p:extLst>
+  </p:cSld>
+  <p:clrMapOvr>
+    <a:masterClrMapping/>
+  </p:clrMapOvr>
+</p:sld>
+</file>
+
+<file path=ppt/slides/slide16.xml><?xml version="1.0" encoding="utf-8"?>
+<p:sld xmlns:a="http://schemas.openxmlformats.org/drawingml/2006/main" xmlns:r="http://schemas.openxmlformats.org/officeDocument/2006/relationships" xmlns:p="http://schemas.openxmlformats.org/presentationml/2006/main">
+  <p:cSld>
+    <p:spTree>
+      <p:nvGrpSpPr>
+        <p:cNvPr id="1" name=""/>
+        <p:cNvGrpSpPr/>
+        <p:nvPr/>
+      </p:nvGrpSpPr>
+      <p:grpSpPr>
+        <a:xfrm>
+          <a:off x="0" y="0"/>
+          <a:ext cx="0" cy="0"/>
+          <a:chOff x="0" y="0"/>
+          <a:chExt cx="0" cy="0"/>
+        </a:xfrm>
+      </p:grpSpPr>
+      <p:sp>
+        <p:nvSpPr>
+          <p:cNvPr id="2" name="Title 1"/>
+          <p:cNvSpPr>
+            <a:spLocks noGrp="1"/>
+          </p:cNvSpPr>
+          <p:nvPr>
+            <p:ph type="title"/>
+          </p:nvPr>
+        </p:nvSpPr>
+        <p:spPr/>
+        <p:txBody>
+          <a:bodyPr/>
+          <a:lstStyle/>
+          <a:p>
+            <a:r>
               <a:rPr lang="en-US" dirty="0" err="1" smtClean="0"/>
               <a:t>Deloading</a:t>
             </a:r>
@@ -4951,7 +6086,7 @@
 </p:sld>
 </file>
 
-<file path=ppt/slides/slide16.xml><?xml version="1.0" encoding="utf-8"?>
+<file path=ppt/slides/slide17.xml><?xml version="1.0" encoding="utf-8"?>
 <p:sld xmlns:a="http://schemas.openxmlformats.org/drawingml/2006/main" xmlns:r="http://schemas.openxmlformats.org/officeDocument/2006/relationships" xmlns:p="http://schemas.openxmlformats.org/presentationml/2006/main">
   <p:cSld>
     <p:spTree>
@@ -5756,14 +6891,12 @@
         </p:nvSpPr>
         <p:spPr/>
         <p:txBody>
-          <a:bodyPr>
-            <a:normAutofit/>
-          </a:bodyPr>
+          <a:bodyPr/>
           <a:lstStyle/>
           <a:p>
             <a:r>
               <a:rPr lang="en-US" dirty="0" smtClean="0"/>
-              <a:t>Modeling</a:t>
+              <a:t>Impact of Renewables</a:t>
             </a:r>
             <a:endParaRPr lang="en-US" dirty="0"/>
           </a:p>
@@ -5779,71 +6912,35 @@
             <p:ph idx="1"/>
           </p:nvPr>
         </p:nvSpPr>
-        <p:spPr>
-          <a:xfrm>
-            <a:off x="946404" y="1828801"/>
-            <a:ext cx="6685319" cy="4325814"/>
-          </a:xfrm>
-        </p:spPr>
-        <p:txBody>
-          <a:bodyPr>
-            <a:normAutofit/>
-          </a:bodyPr>
+        <p:spPr/>
+        <p:txBody>
+          <a:bodyPr/>
           <a:lstStyle/>
           <a:p>
             <a:r>
               <a:rPr lang="en-US" dirty="0" smtClean="0"/>
-              <a:t>Simulation </a:t>
-            </a:r>
+              <a:t>No inertia (H = 0) </a:t>
+            </a:r>
+          </a:p>
+          <a:p>
             <a:r>
               <a:rPr lang="en-US" dirty="0" smtClean="0"/>
-              <a:t>software (i.e. “insert simulation software name here”)</a:t>
-            </a:r>
-            <a:endParaRPr lang="en-US" dirty="0" smtClean="0"/>
-          </a:p>
-          <a:p>
-            <a:pPr lvl="1"/>
+              <a:t>Increased frequency response</a:t>
+            </a:r>
+          </a:p>
+          <a:p>
             <a:r>
               <a:rPr lang="en-US" dirty="0" smtClean="0"/>
-              <a:t>Used </a:t>
-            </a:r>
-            <a:r>
-              <a:rPr lang="en-US" dirty="0" smtClean="0"/>
-              <a:t>as a comparison tool to validate simplified models in THIS paper</a:t>
-            </a:r>
-          </a:p>
-          <a:p>
-            <a:pPr lvl="1"/>
-            <a:r>
-              <a:rPr lang="en-US" dirty="0" smtClean="0"/>
-              <a:t>Complicated </a:t>
-            </a:r>
-            <a:r>
-              <a:rPr lang="en-US" dirty="0" smtClean="0"/>
-              <a:t>(many variables)</a:t>
-            </a:r>
-          </a:p>
-          <a:p>
-            <a:pPr lvl="1"/>
-            <a:r>
-              <a:rPr lang="en-US" dirty="0" smtClean="0"/>
-              <a:t>Expensive (time and money)</a:t>
-            </a:r>
-          </a:p>
-          <a:p>
-            <a:pPr lvl="1"/>
+              <a:t>Less control</a:t>
+            </a:r>
             <a:endParaRPr lang="en-US" dirty="0"/>
-          </a:p>
-          <a:p>
-            <a:pPr lvl="1"/>
-            <a:endParaRPr lang="en-US" dirty="0" smtClean="0"/>
           </a:p>
         </p:txBody>
       </p:sp>
     </p:spTree>
     <p:extLst>
       <p:ext uri="{BB962C8B-B14F-4D97-AF65-F5344CB8AC3E}">
-        <p14:creationId xmlns:p14="http://schemas.microsoft.com/office/powerpoint/2010/main" val="3084728371"/>
+        <p14:creationId xmlns:p14="http://schemas.microsoft.com/office/powerpoint/2010/main" val="3602025122"/>
       </p:ext>
     </p:extLst>
   </p:cSld>
@@ -5882,7 +6979,9 @@
         </p:nvSpPr>
         <p:spPr/>
         <p:txBody>
-          <a:bodyPr/>
+          <a:bodyPr>
+            <a:normAutofit/>
+          </a:bodyPr>
           <a:lstStyle/>
           <a:p>
             <a:r>
@@ -5905,47 +7004,69 @@
         </p:nvSpPr>
         <p:spPr>
           <a:xfrm>
-            <a:off x="946404" y="1846385"/>
-            <a:ext cx="6446520" cy="4333753"/>
+            <a:off x="946404" y="1828801"/>
+            <a:ext cx="6685319" cy="4325814"/>
           </a:xfrm>
         </p:spPr>
         <p:txBody>
-          <a:bodyPr/>
+          <a:bodyPr>
+            <a:normAutofit/>
+          </a:bodyPr>
           <a:lstStyle/>
           <a:p>
             <a:r>
-              <a:rPr lang="en-US" dirty="0"/>
-              <a:t>Full network </a:t>
-            </a:r>
-            <a:r>
               <a:rPr lang="en-US" dirty="0" smtClean="0"/>
-              <a:t>models (as in THIS paper)</a:t>
-            </a:r>
+              <a:t>Simulation </a:t>
+            </a:r>
+            <a:r>
+              <a:rPr lang="en-US" dirty="0" smtClean="0"/>
+              <a:t>software (i.e. “insert simulation software name here”)</a:t>
+            </a:r>
+            <a:endParaRPr lang="en-US" dirty="0" smtClean="0"/>
+          </a:p>
+          <a:p>
+            <a:pPr lvl="1"/>
+            <a:r>
+              <a:rPr lang="en-US" dirty="0" smtClean="0"/>
+              <a:t>Used </a:t>
+            </a:r>
+            <a:r>
+              <a:rPr lang="en-US" dirty="0" smtClean="0"/>
+              <a:t>as a comparison tool to validate simplified models in THIS paper</a:t>
+            </a:r>
+          </a:p>
+          <a:p>
+            <a:pPr lvl="1"/>
+            <a:r>
+              <a:rPr lang="en-US" dirty="0" smtClean="0"/>
+              <a:t>Complicated </a:t>
+            </a:r>
+            <a:r>
+              <a:rPr lang="en-US" dirty="0" smtClean="0"/>
+              <a:t>(many variables)</a:t>
+            </a:r>
+          </a:p>
+          <a:p>
+            <a:pPr lvl="1"/>
+            <a:r>
+              <a:rPr lang="en-US" dirty="0" smtClean="0"/>
+              <a:t>Expensive (time and money)</a:t>
+            </a:r>
+          </a:p>
+          <a:p>
+            <a:pPr lvl="1"/>
             <a:endParaRPr lang="en-US" dirty="0"/>
           </a:p>
           <a:p>
             <a:pPr lvl="1"/>
-            <a:r>
-              <a:rPr lang="en-US" dirty="0"/>
-              <a:t>Complicated (many variables)</a:t>
-            </a:r>
-          </a:p>
-          <a:p>
-            <a:pPr lvl="1"/>
-            <a:r>
-              <a:rPr lang="en-US" dirty="0"/>
-              <a:t>Time</a:t>
-            </a:r>
-          </a:p>
-          <a:p>
-            <a:endParaRPr lang="en-US" dirty="0"/>
+            <a:endParaRPr lang="en-US" dirty="0" smtClean="0"/>
           </a:p>
         </p:txBody>
       </p:sp>
     </p:spTree>
     <p:extLst>
       <p:ext uri="{BB962C8B-B14F-4D97-AF65-F5344CB8AC3E}">
-        <p14:creationId xmlns:p14="http://schemas.microsoft.com/office/powerpoint/2010/main" val="1809242005"/>
+        <p14:creationId xmlns:p14="http://schemas.microsoft.com/office/powerpoint/2010/main" val="3084728371"/>
       </p:ext>
     </p:extLst>
   </p:cSld>
@@ -6005,28 +7126,38 @@
             <p:ph idx="1"/>
           </p:nvPr>
         </p:nvSpPr>
-        <p:spPr/>
+        <p:spPr>
+          <a:xfrm>
+            <a:off x="946404" y="1846385"/>
+            <a:ext cx="6446520" cy="4333753"/>
+          </a:xfrm>
+        </p:spPr>
         <p:txBody>
           <a:bodyPr/>
           <a:lstStyle/>
           <a:p>
             <a:r>
               <a:rPr lang="en-US" dirty="0"/>
-              <a:t>Simplified Models (Aggregated Swing eq. Average Freq.)</a:t>
-            </a:r>
+              <a:t>Full network </a:t>
+            </a:r>
+            <a:r>
+              <a:rPr lang="en-US" dirty="0" smtClean="0"/>
+              <a:t>models (as in THIS paper)</a:t>
+            </a:r>
+            <a:endParaRPr lang="en-US" dirty="0"/>
           </a:p>
           <a:p>
             <a:pPr lvl="1"/>
             <a:r>
               <a:rPr lang="en-US" dirty="0"/>
-              <a:t>Marginally less accurate</a:t>
+              <a:t>Complicated (many variables)</a:t>
             </a:r>
           </a:p>
           <a:p>
             <a:pPr lvl="1"/>
             <a:r>
               <a:rPr lang="en-US" dirty="0"/>
-              <a:t>Easy to use</a:t>
+              <a:t>Time</a:t>
             </a:r>
           </a:p>
           <a:p>
@@ -6037,7 +7168,7 @@
     </p:spTree>
     <p:extLst>
       <p:ext uri="{BB962C8B-B14F-4D97-AF65-F5344CB8AC3E}">
-        <p14:creationId xmlns:p14="http://schemas.microsoft.com/office/powerpoint/2010/main" val="1878603003"/>
+        <p14:creationId xmlns:p14="http://schemas.microsoft.com/office/powerpoint/2010/main" val="1809242005"/>
       </p:ext>
     </p:extLst>
   </p:cSld>
@@ -6081,11 +7212,103 @@
           <a:p>
             <a:r>
               <a:rPr lang="en-US" dirty="0" smtClean="0"/>
+              <a:t>Modeling</a:t>
+            </a:r>
+            <a:endParaRPr lang="en-US" dirty="0"/>
+          </a:p>
+        </p:txBody>
+      </p:sp>
+      <p:sp>
+        <p:nvSpPr>
+          <p:cNvPr id="3" name="Content Placeholder 2"/>
+          <p:cNvSpPr>
+            <a:spLocks noGrp="1"/>
+          </p:cNvSpPr>
+          <p:nvPr>
+            <p:ph idx="1"/>
+          </p:nvPr>
+        </p:nvSpPr>
+        <p:spPr/>
+        <p:txBody>
+          <a:bodyPr/>
+          <a:lstStyle/>
+          <a:p>
+            <a:r>
+              <a:rPr lang="en-US" dirty="0"/>
+              <a:t>Simplified Models (Aggregated Swing eq. Average Freq.)</a:t>
+            </a:r>
+          </a:p>
+          <a:p>
+            <a:pPr lvl="1"/>
+            <a:r>
+              <a:rPr lang="en-US" dirty="0"/>
+              <a:t>Marginally less accurate</a:t>
+            </a:r>
+          </a:p>
+          <a:p>
+            <a:pPr lvl="1"/>
+            <a:r>
+              <a:rPr lang="en-US" dirty="0"/>
+              <a:t>Easy to use</a:t>
+            </a:r>
+          </a:p>
+          <a:p>
+            <a:endParaRPr lang="en-US" dirty="0"/>
+          </a:p>
+        </p:txBody>
+      </p:sp>
+    </p:spTree>
+    <p:extLst>
+      <p:ext uri="{BB962C8B-B14F-4D97-AF65-F5344CB8AC3E}">
+        <p14:creationId xmlns:p14="http://schemas.microsoft.com/office/powerpoint/2010/main" val="1878603003"/>
+      </p:ext>
+    </p:extLst>
+  </p:cSld>
+  <p:clrMapOvr>
+    <a:masterClrMapping/>
+  </p:clrMapOvr>
+</p:sld>
+</file>
+
+<file path=ppt/slides/slide9.xml><?xml version="1.0" encoding="utf-8"?>
+<p:sld xmlns:a="http://schemas.openxmlformats.org/drawingml/2006/main" xmlns:r="http://schemas.openxmlformats.org/officeDocument/2006/relationships" xmlns:p="http://schemas.openxmlformats.org/presentationml/2006/main">
+  <p:cSld>
+    <p:spTree>
+      <p:nvGrpSpPr>
+        <p:cNvPr id="1" name=""/>
+        <p:cNvGrpSpPr/>
+        <p:nvPr/>
+      </p:nvGrpSpPr>
+      <p:grpSpPr>
+        <a:xfrm>
+          <a:off x="0" y="0"/>
+          <a:ext cx="0" cy="0"/>
+          <a:chOff x="0" y="0"/>
+          <a:chExt cx="0" cy="0"/>
+        </a:xfrm>
+      </p:grpSpPr>
+      <p:sp>
+        <p:nvSpPr>
+          <p:cNvPr id="2" name="Title 1"/>
+          <p:cNvSpPr>
+            <a:spLocks noGrp="1"/>
+          </p:cNvSpPr>
+          <p:nvPr>
+            <p:ph type="title"/>
+          </p:nvPr>
+        </p:nvSpPr>
+        <p:spPr/>
+        <p:txBody>
+          <a:bodyPr/>
+          <a:lstStyle/>
+          <a:p>
+            <a:r>
+              <a:rPr lang="en-US" dirty="0" smtClean="0"/>
               <a:t>Swing </a:t>
             </a:r>
             <a:r>
               <a:rPr lang="en-US" dirty="0" smtClean="0"/>
-              <a:t>Equation (no control)</a:t>
+              <a:t>Equation</a:t>
             </a:r>
             <a:endParaRPr lang="en-US" dirty="0"/>
           </a:p>
@@ -6105,8 +7328,8 @@
             </p:nvSpPr>
             <p:spPr>
               <a:xfrm>
-                <a:off x="457200" y="1916723"/>
-                <a:ext cx="7758684" cy="4413739"/>
+                <a:off x="747399" y="1828772"/>
+                <a:ext cx="7209692" cy="4413739"/>
               </a:xfrm>
             </p:spPr>
             <p:txBody>
@@ -6870,13 +8093,13 @@
             </p:nvSpPr>
             <p:spPr>
               <a:xfrm>
-                <a:off x="457200" y="1916723"/>
-                <a:ext cx="7758684" cy="4413739"/>
+                <a:off x="747399" y="1828772"/>
+                <a:ext cx="7209692" cy="4413739"/>
               </a:xfrm>
               <a:blipFill rotWithShape="0">
                 <a:blip r:embed="rId3"/>
                 <a:stretch>
-                  <a:fillRect l="-157" t="-138"/>
+                  <a:fillRect l="-169" t="-276"/>
                 </a:stretch>
               </a:blipFill>
             </p:spPr>
@@ -6929,78 +8152,6 @@
     <p:extLst>
       <p:ext uri="{BB962C8B-B14F-4D97-AF65-F5344CB8AC3E}">
         <p14:creationId xmlns:p14="http://schemas.microsoft.com/office/powerpoint/2010/main" val="1880205081"/>
-      </p:ext>
-    </p:extLst>
-  </p:cSld>
-  <p:clrMapOvr>
-    <a:masterClrMapping/>
-  </p:clrMapOvr>
-</p:sld>
-</file>
-
-<file path=ppt/slides/slide9.xml><?xml version="1.0" encoding="utf-8"?>
-<p:sld xmlns:a="http://schemas.openxmlformats.org/drawingml/2006/main" xmlns:r="http://schemas.openxmlformats.org/officeDocument/2006/relationships" xmlns:p="http://schemas.openxmlformats.org/presentationml/2006/main">
-  <p:cSld>
-    <p:spTree>
-      <p:nvGrpSpPr>
-        <p:cNvPr id="1" name=""/>
-        <p:cNvGrpSpPr/>
-        <p:nvPr/>
-      </p:nvGrpSpPr>
-      <p:grpSpPr>
-        <a:xfrm>
-          <a:off x="0" y="0"/>
-          <a:ext cx="0" cy="0"/>
-          <a:chOff x="0" y="0"/>
-          <a:chExt cx="0" cy="0"/>
-        </a:xfrm>
-      </p:grpSpPr>
-      <p:sp>
-        <p:nvSpPr>
-          <p:cNvPr id="2" name="Title 1"/>
-          <p:cNvSpPr>
-            <a:spLocks noGrp="1"/>
-          </p:cNvSpPr>
-          <p:nvPr>
-            <p:ph type="title"/>
-          </p:nvPr>
-        </p:nvSpPr>
-        <p:spPr/>
-        <p:txBody>
-          <a:bodyPr/>
-          <a:lstStyle/>
-          <a:p>
-            <a:r>
-              <a:rPr lang="en-US" dirty="0" smtClean="0"/>
-              <a:t>Results</a:t>
-            </a:r>
-            <a:endParaRPr lang="en-US" dirty="0"/>
-          </a:p>
-        </p:txBody>
-      </p:sp>
-      <p:sp>
-        <p:nvSpPr>
-          <p:cNvPr id="3" name="Content Placeholder 2"/>
-          <p:cNvSpPr>
-            <a:spLocks noGrp="1"/>
-          </p:cNvSpPr>
-          <p:nvPr>
-            <p:ph idx="1"/>
-          </p:nvPr>
-        </p:nvSpPr>
-        <p:spPr/>
-        <p:txBody>
-          <a:bodyPr/>
-          <a:lstStyle/>
-          <a:p>
-            <a:endParaRPr lang="en-US" dirty="0"/>
-          </a:p>
-        </p:txBody>
-      </p:sp>
-    </p:spTree>
-    <p:extLst>
-      <p:ext uri="{BB962C8B-B14F-4D97-AF65-F5344CB8AC3E}">
-        <p14:creationId xmlns:p14="http://schemas.microsoft.com/office/powerpoint/2010/main" val="1301709328"/>
       </p:ext>
     </p:extLst>
   </p:cSld>

</xml_diff>